<commit_message>
Updating the doc for the data managment
</commit_message>
<xml_diff>
--- a/Overal_data_curation2.pptx
+++ b/Overal_data_curation2.pptx
@@ -4071,7 +4071,31 @@
                   <a:schemeClr val="accent1"/>
                 </a:solidFill>
               </a:rPr>
-              <a:t>QC_Aci_data.Rdata</a:t>
+              <a:t>QC</a:t>
+            </a:r>
+            <a:r>
+              <a:rPr lang="fr-FR" sz="1200" err="1">
+                <a:solidFill>
+                  <a:schemeClr val="accent1"/>
+                </a:solidFill>
+              </a:rPr>
+              <a:t>_</a:t>
+            </a:r>
+            <a:r>
+              <a:rPr lang="fr-FR" sz="1200">
+                <a:solidFill>
+                  <a:schemeClr val="accent1"/>
+                </a:solidFill>
+              </a:rPr>
+              <a:t>ACi</a:t>
+            </a:r>
+            <a:r>
+              <a:rPr lang="fr-FR" sz="1200" dirty="0" err="1">
+                <a:solidFill>
+                  <a:schemeClr val="accent1"/>
+                </a:solidFill>
+              </a:rPr>
+              <a:t>_data.Rdata</a:t>
             </a:r>
             <a:r>
               <a:rPr lang="fr-FR" sz="1200" dirty="0">

</xml_diff>